<commit_message>
Working evaluation of dummy optimizer of test function.
</commit_message>
<xml_diff>
--- a/AFO.pptx
+++ b/AFO.pptx
@@ -7,6 +7,7 @@
   <p:sldIdLst>
     <p:sldId id="256" r:id="rId2"/>
     <p:sldId id="257" r:id="rId3"/>
+    <p:sldId id="258" r:id="rId4"/>
   </p:sldIdLst>
   <p:sldSz cx="12192000" cy="6858000"/>
   <p:notesSz cx="6858000" cy="9144000"/>
@@ -105,7 +106,168 @@
       </a:defRPr>
     </a:lvl9pPr>
   </p:defaultTextStyle>
+  <p:extLst>
+    <p:ext uri="{EFAFB233-063F-42B5-8137-9DF3F51BA10A}">
+      <p15:sldGuideLst xmlns:p15="http://schemas.microsoft.com/office/powerpoint/2012/main"/>
+    </p:ext>
+  </p:extLst>
 </p:presentation>
+</file>
+
+<file path=ppt/ink/ink1.xml><?xml version="1.0" encoding="utf-8"?>
+<inkml:ink xmlns:inkml="http://www.w3.org/2003/InkML">
+  <inkml:definitions>
+    <inkml:context xml:id="ctx0">
+      <inkml:inkSource xml:id="inkSrc0">
+        <inkml:traceFormat>
+          <inkml:channel name="X" type="integer" min="-2.14748E9" max="2.14748E9" units="cm"/>
+          <inkml:channel name="Y" type="integer" min="-2.14748E9" max="2.14748E9" units="cm"/>
+        </inkml:traceFormat>
+        <inkml:channelProperties>
+          <inkml:channelProperty channel="X" name="resolution" value="1000" units="1/cm"/>
+          <inkml:channelProperty channel="Y" name="resolution" value="1000" units="1/cm"/>
+        </inkml:channelProperties>
+      </inkml:inkSource>
+      <inkml:timestamp xml:id="ts0" timeString="2020-09-11T13:31:52.173"/>
+    </inkml:context>
+    <inkml:brush xml:id="br0">
+      <inkml:brushProperty name="width" value="0.05" units="cm"/>
+      <inkml:brushProperty name="height" value="0.05" units="cm"/>
+      <inkml:brushProperty name="ignorePressure" value="1"/>
+    </inkml:brush>
+  </inkml:definitions>
+  <inkml:trace contextRef="#ctx0" brushRef="#br0">0 2,'140'-1,"66"0,165 22,-153 9,-2 9,-1 10,29 19,-90-22,207 66,-228-65,84 45,-107-33,-2 5,48 41,51 31,-18-18,222 128,-252-165,-59-31,75 49,56 38,-83-53,285 152,-351-194,85 52,128 97,-195-114,-3 5,-4 4,9 17,125 116,-28-53,73 68,-144-123,60 36,-70-59,-5 6,18 26,-94-86,1-1,1-2,2-2,20 11,177 89,-119-67,-1-5,3-6,57 13,-44-16,111 58,-124-50,3-6,1-5,2-5,25 0,162 26,48-7,270 18,-580-71,160 9,36-9,-53-3,110 20,134 41,229 73,-87 31,-183-60,-154-45,0 11,-147-39,79 41,-127-51,-1 2,-1 3,-1 1,12 14,-9-5,1-2,3-3,0-1,2-3,2-3,14 4,-5-6,0-1,-1 3,55 33,16 18,2-5,111 40,-193-91,45 25,-77-35,0 2,-1 1,0 1,-1 0,0 4,-18-18,113 102,-95-88,0-1,2-1,0-1,17 7,10 4,-15-7,0-2,15 3,-40-15,1-1,0 0,0-1,0 0,0-1,0 0,0-1,0 0,11-3,-23 3,0 0</inkml:trace>
+</inkml:ink>
+</file>
+
+<file path=ppt/ink/ink2.xml><?xml version="1.0" encoding="utf-8"?>
+<inkml:ink xmlns:inkml="http://www.w3.org/2003/InkML">
+  <inkml:definitions>
+    <inkml:context xml:id="ctx0">
+      <inkml:inkSource xml:id="inkSrc0">
+        <inkml:traceFormat>
+          <inkml:channel name="X" type="integer" min="-2.14748E9" max="2.14748E9" units="cm"/>
+          <inkml:channel name="Y" type="integer" min="-2.14748E9" max="2.14748E9" units="cm"/>
+        </inkml:traceFormat>
+        <inkml:channelProperties>
+          <inkml:channelProperty channel="X" name="resolution" value="1000" units="1/cm"/>
+          <inkml:channelProperty channel="Y" name="resolution" value="1000" units="1/cm"/>
+        </inkml:channelProperties>
+      </inkml:inkSource>
+      <inkml:timestamp xml:id="ts0" timeString="2020-09-11T13:32:01.990"/>
+    </inkml:context>
+    <inkml:brush xml:id="br0">
+      <inkml:brushProperty name="width" value="0.05" units="cm"/>
+      <inkml:brushProperty name="height" value="0.05" units="cm"/>
+      <inkml:brushProperty name="ignorePressure" value="1"/>
+    </inkml:brush>
+  </inkml:definitions>
+  <inkml:trace contextRef="#ctx0" brushRef="#br0">0 20,'389'-13,"-213"7,21 7,-42 1,-48 2,31 8,-29-1,17-5,-115-6,46 0,32 6,-70-4,0 2,1 0,-1 1,0 1,-1 0,8 5,85 41,2-5,2-4,75 14,-103-33,-1 4,-1 3,-1 4,17 13,154 68,-139-67,-2 5,-3 5,25 22,-71-43,2-2,1-3,63 20,14 7,-46-14,-41-17,2-2,46 12,292 70,-308-80,-1 4,11 9,-43-18,234 106,-228-98,-1 3,-2 3,25 23,-48-34,1-1,1-2,1-2,1-2,9 3,124 54,73 51,-190-94,-3 3,28 25,36 26,-17-15,-2 5,14 20,174 182,-51-64,-17-18,-114-89,57 55,-127-132,2-1,1-2,32 18,-20-22,1-1,0-3,2-2,11 1,0 0,-1 3,43 24,-15-6,2-4,78 20,-46-16,22 15,-37-8,36 16,3-7,185 44,11-13,-144-38,61 27,-30-7,-141-46,74 20,45 23,-183-58,0-2,0 0,0-2,19 1,111 3,-109-8,33 1,-37-2,1 1,-1 3,0 1,0 3,15 5,478 144,-463-137,3-3,-19-5,0 3,20 9,-15 3,5 5,-15-6,40 12,-73-32,-1 0,1-1,0-1,0-1,0-1,19 0,-19-3,-2 1,0 0,0 1,4 1,-15 0,0-1,0 1,1 1,-2-1,1 1,0 0,0 1,-1 0,4 3,65 41,1-2,3-4,1-3,59 18,-43-18,-1 5,-3 4,9 9,-57-34,2-2,0-1,1-3,4-1,31 12,1 1,-2-2,41 23,-100-39,-1 2,11 8,-17-11,1 0,0 0,0-2,1 0,4 1,-2-1,0 1,-1 1,-1 0,0 2,0 0,-1 0,0 2,8 6,0-2,22 12,29 10,-17-10,-2 3,4 6,310 238,-206-170,-29-20,-84-46,-2 1,-2 3,32 39,1 1,-60-66,1-2,0 0,7 2,-10-6,18 13,-17-10,1-2,1 0,0-1,1-1,0-1,1-1,0-1,1 0,1-4,0-1,1-1,-1-1,17-1,21 1,8 5,-31-2,30-1,285 7,-262-7,6-4,-98 1,0-1,0 1,-1 0,1 0,0 0,0 0,-1 0,1 0,-1 0,1 0,-1 0,1 0,-1 0,1 0,-1 0,0 0,0 0,1 0,-1 0,0 1,0-1,0 3,6 19,-1 0</inkml:trace>
+</inkml:ink>
+</file>
+
+<file path=ppt/ink/ink3.xml><?xml version="1.0" encoding="utf-8"?>
+<inkml:ink xmlns:inkml="http://www.w3.org/2003/InkML">
+  <inkml:definitions>
+    <inkml:context xml:id="ctx0">
+      <inkml:inkSource xml:id="inkSrc0">
+        <inkml:traceFormat>
+          <inkml:channel name="X" type="integer" min="-2.14748E9" max="2.14748E9" units="cm"/>
+          <inkml:channel name="Y" type="integer" min="-2.14748E9" max="2.14748E9" units="cm"/>
+        </inkml:traceFormat>
+        <inkml:channelProperties>
+          <inkml:channelProperty channel="X" name="resolution" value="1000" units="1/cm"/>
+          <inkml:channelProperty channel="Y" name="resolution" value="1000" units="1/cm"/>
+        </inkml:channelProperties>
+      </inkml:inkSource>
+      <inkml:timestamp xml:id="ts0" timeString="2020-09-11T13:31:36.489"/>
+    </inkml:context>
+    <inkml:brush xml:id="br0">
+      <inkml:brushProperty name="width" value="0.05" units="cm"/>
+      <inkml:brushProperty name="height" value="0.05" units="cm"/>
+      <inkml:brushProperty name="ignorePressure" value="1"/>
+    </inkml:brush>
+  </inkml:definitions>
+  <inkml:trace contextRef="#ctx0" brushRef="#br0">0 0,'45'243,"5"157,-37-276,28 333,-16 215,-63 1047,18-210,26-316,-3-219,37-209,-26-582,0 62,14 163,-7-247,9 9,-8-52,-5 1,0 82,-17-183,-1-16,1 1,0-1,0 1,0 0,0-1,0 1,1-1,-1 1,1-1,-1 1,1-1,1 2,1 2</inkml:trace>
+</inkml:ink>
+</file>
+
+<file path=ppt/ink/ink4.xml><?xml version="1.0" encoding="utf-8"?>
+<inkml:ink xmlns:inkml="http://www.w3.org/2003/InkML">
+  <inkml:definitions>
+    <inkml:context xml:id="ctx0">
+      <inkml:inkSource xml:id="inkSrc0">
+        <inkml:traceFormat>
+          <inkml:channel name="X" type="integer" min="-2.14748E9" max="2.14748E9" units="cm"/>
+          <inkml:channel name="Y" type="integer" min="-2.14748E9" max="2.14748E9" units="cm"/>
+        </inkml:traceFormat>
+        <inkml:channelProperties>
+          <inkml:channelProperty channel="X" name="resolution" value="1000" units="1/cm"/>
+          <inkml:channelProperty channel="Y" name="resolution" value="1000" units="1/cm"/>
+        </inkml:channelProperties>
+      </inkml:inkSource>
+      <inkml:timestamp xml:id="ts0" timeString="2020-09-11T13:31:37.922"/>
+    </inkml:context>
+    <inkml:brush xml:id="br0">
+      <inkml:brushProperty name="width" value="0.05" units="cm"/>
+      <inkml:brushProperty name="height" value="0.05" units="cm"/>
+      <inkml:brushProperty name="ignorePressure" value="1"/>
+    </inkml:brush>
+  </inkml:definitions>
+  <inkml:trace contextRef="#ctx0" brushRef="#br0">161 138,'31'30,"2"-1,16 9,20 18,13 18,-3 4,-4 4,-4 2,54 83,-71-90,51 54,-70-92,2-2,2-1,42 30,-84-67,1 0,-1 1,1-1,-1 1,0-1,1 1,-1 0,0-1,1 2,-1-1,0 0,1 0,-3 1,-45 9,30-6,-65 8,-1-5,-39-3,16 0,-381 2,420-6,58-23,4 2,2 0,0 0,1 0,1 0,0-16,-1-34,3-4,3-31,5 0,4 1,5 0,4 1,11-21,-22 96,1 0,2 0,7-12,-11 28,0-1,1 1,1 0,0 1,1 0,0 0,8-6,-8 9</inkml:trace>
+</inkml:ink>
+</file>
+
+<file path=ppt/ink/ink5.xml><?xml version="1.0" encoding="utf-8"?>
+<inkml:ink xmlns:inkml="http://www.w3.org/2003/InkML">
+  <inkml:definitions>
+    <inkml:context xml:id="ctx0">
+      <inkml:inkSource xml:id="inkSrc0">
+        <inkml:traceFormat>
+          <inkml:channel name="X" type="integer" min="-2.14748E9" max="2.14748E9" units="cm"/>
+          <inkml:channel name="Y" type="integer" min="-2.14748E9" max="2.14748E9" units="cm"/>
+        </inkml:traceFormat>
+        <inkml:channelProperties>
+          <inkml:channelProperty channel="X" name="resolution" value="1000" units="1/cm"/>
+          <inkml:channelProperty channel="Y" name="resolution" value="1000" units="1/cm"/>
+        </inkml:channelProperties>
+      </inkml:inkSource>
+      <inkml:timestamp xml:id="ts0" timeString="2020-09-11T13:31:40.740"/>
+    </inkml:context>
+    <inkml:brush xml:id="br0">
+      <inkml:brushProperty name="width" value="0.05" units="cm"/>
+      <inkml:brushProperty name="height" value="0.05" units="cm"/>
+      <inkml:brushProperty name="ignorePressure" value="1"/>
+    </inkml:brush>
+  </inkml:definitions>
+  <inkml:trace contextRef="#ctx0" brushRef="#br0">1 1550,'315'-12,"127"-28,-201 15,880-46,101-15,-457 25,4 28,-696 32,1222-39,-650-10,361-23,-90 59,6 39,-594-14,621 1,-31-1,191 33,-9 0,2-31,1568 43,-825 4,-1751-57,1250-13,-285-4,-284 38,107 1,-846-25,246-7,-212 2,0-3,69-18,-83 12,10-3,6 3,-51 11,0 0,0 2,0 0,0 2,12 1,-38 0,1 0,-1 0,0 0,1 1,0-1,-1 1,-1 2,-13 8,-171 111,0 12,-8 6,115-87,-2-4,-3-3,-2-5,-1-4,-2-3,-78 17,158-49,8-2,0 0,0 0,0-1,0 0,0 0,0 0,-1 0,1-1,0 0,0 0,-1-1,-3 0,28-6,56-14,0-4,63-30,141-80,-95 43,-43 30,94-27,150-31,-259 82,-101 31,3-1,0-1,-1-1,0-1,0-2,2-2,-28 14,-1 1,1 0,-1 0,1-1,-1 1,0 0,1-1,-1 1,1 0,-1-1,0 1,1-1,-1 1,0 0,1-1,-1 1,0-1,0 1,1-1,-1 1,0-1,0 1,0-1,0 0,0 1,0-1,0 1,0-1,0 1,0-1,0 1,0-1,0 1,0-1,0 1,-1-1,1 0,-16-17,14 16,-95-81,-3 5,-31-15,84 60,-1134-740,1168 766,-66-41,-2 4,-2 3,-39-11,114 50,0-2,1 2,-1-1,0 1,0 0,0 1,0 0,0 0,0 0,0 1,-1 1,8-1,0 0,0 0,0 1,0-1,1 0,-1 1,0-1,0 1,0-1,0 1,0-1,1 1,-1 0,0-1,1 1,-1 0,0 0,1 0,-1-1,1 1,-1 0,1 0,-1 0,1 0,0 0,0 0,-1 0,-2 29,3-27,2 36,0 0,3-1,1 1,7 19,48 150,-52-180,91 258,-45-139,-6 3,13 83,-55-201,-2 0,0 1,-3 0,0 0,-3 0,0 0,-2 0,-2-1,0 1,-3-1,0 0,-6 10,6-23,1-1,0 2,2-1,0 1,1 0,1 0,1 0,1 0,1 20,1-34</inkml:trace>
+</inkml:ink>
+</file>
+
+<file path=ppt/ink/ink6.xml><?xml version="1.0" encoding="utf-8"?>
+<inkml:ink xmlns:inkml="http://www.w3.org/2003/InkML">
+  <inkml:definitions>
+    <inkml:context xml:id="ctx0">
+      <inkml:inkSource xml:id="inkSrc0">
+        <inkml:traceFormat>
+          <inkml:channel name="X" type="integer" min="-2.14748E9" max="2.14748E9" units="cm"/>
+          <inkml:channel name="Y" type="integer" min="-2.14748E9" max="2.14748E9" units="cm"/>
+        </inkml:traceFormat>
+        <inkml:channelProperties>
+          <inkml:channelProperty channel="X" name="resolution" value="1000" units="1/cm"/>
+          <inkml:channelProperty channel="Y" name="resolution" value="1000" units="1/cm"/>
+        </inkml:channelProperties>
+      </inkml:inkSource>
+      <inkml:timestamp xml:id="ts0" timeString="2020-09-11T13:32:08.538"/>
+    </inkml:context>
+    <inkml:brush xml:id="br0">
+      <inkml:brushProperty name="width" value="0.05" units="cm"/>
+      <inkml:brushProperty name="height" value="0.05" units="cm"/>
+      <inkml:brushProperty name="ignorePressure" value="1"/>
+    </inkml:brush>
+  </inkml:definitions>
+  <inkml:trace contextRef="#ctx0" brushRef="#br0">0 2,'190'-1,"198"3,-363 1,0 1,0 1,-1 2,0 0,0 1,2 3,36 11,160 44,7-10,-176-41,0 3,-2 2,2 3,70 26,-37-19,-1 4,77 43,-104-45,-21-13,-1 1,-1 2,0 1,-2 2,24 24,-41-34,1-1,0 0,1-2,0 0,1-1,0 0,20 6,28 9,55 12,-17-6,-83-25,60 21,3-4,-55-17,-1-2,1 0,0-3,26 0,47-4,-33-2,-1 4,1 3,-1 2,3 5,-35-1,0 2,-1 1,4 4,60 20,127 25,-101-29,-2 6,45 22,104 45,-61-26,-183-66,0 1,-1 1,0 2,-2 1,14 12,3 5,-2 3,28 33,-28-23,13 23,-25-30,2-3,34 34,-13-26,50 33,-39-30,9 11,12 23,-3 4,0 9,50 55,-96-114,3-2,1-1,5 1,128 85,-105-75,-9-8,2-2,1-3,25 7,34 9,42 8,14-8,-66-19,4 7,28 12,146 56,-234-81,0 3,-2 2,-2 2,8 8,-23-12,-9-7,-1-1,2-1,1-1,0-1,1-2,51 16,2-3,0-4,36 2,-38-4,68 26,-34-10,-65-21,45 12,84 38,-148-52,-1 1,-1 1,-1 2,0 1,-1 1,-1 1,21 22,-17-13,-8-5,0-2,2-1,1 0,1-2,0-1,8 3,82 36,57 17,-12-7,-99-44,1-2,1-3,50 6,-83-17,27 3,0-2,1-3,5-2,178-4,-87-2,-64 7,45 9,-48-4,59-2,-96-4,0 1,0 3,0 2,-1 2,0 2,5-1,0-3,0-2,41-1,168-7,-99-2,-99 1,7-4,61-2,1122 8,-1244 1,1 1,-1 0,0 1,0 0,0 1,0 0,-1 1,1 0,0 1,34 14,133 41,-104-38,-1 3,56 29,-34-7,1-5,83 24,-157-60,40 11,-1 4,0 2,45 26,-65-29,1-1,5-1,-19-10,-22-7,1 0,0 0,-1 0,1 1,3 3,98 40,128 77,-175-93,-51-25,107 49,-78-36,0 1,-1 2,4 5,53 29,-34-26,18 4,47 21,-117-49,28 14,1-1,0-2,1-2,39 10,-73-24,0 1,0 0,-1 1,1 0,0-1,0 1,-1 1,0-1,1 1,-1-1,0 1,0 1,0-1,-1 0,1 1,-1 0,1 1,9 18,-1-1</inkml:trace>
+</inkml:ink>
 </file>
 
 <file path=ppt/slideLayouts/slideLayout1.xml><?xml version="1.0" encoding="utf-8"?>
@@ -255,7 +417,7 @@
           <a:p>
             <a:fld id="{474456A3-A4FD-4EE9-98D3-AB4F21933CFF}" type="datetimeFigureOut">
               <a:rPr lang="en-US" smtClean="0"/>
-              <a:t>8/31/2020</a:t>
+              <a:t>9/11/2020</a:t>
             </a:fld>
             <a:endParaRPr lang="en-US"/>
           </a:p>
@@ -453,7 +615,7 @@
           <a:p>
             <a:fld id="{474456A3-A4FD-4EE9-98D3-AB4F21933CFF}" type="datetimeFigureOut">
               <a:rPr lang="en-US" smtClean="0"/>
-              <a:t>8/31/2020</a:t>
+              <a:t>9/11/2020</a:t>
             </a:fld>
             <a:endParaRPr lang="en-US"/>
           </a:p>
@@ -661,7 +823,7 @@
           <a:p>
             <a:fld id="{474456A3-A4FD-4EE9-98D3-AB4F21933CFF}" type="datetimeFigureOut">
               <a:rPr lang="en-US" smtClean="0"/>
-              <a:t>8/31/2020</a:t>
+              <a:t>9/11/2020</a:t>
             </a:fld>
             <a:endParaRPr lang="en-US"/>
           </a:p>
@@ -859,7 +1021,7 @@
           <a:p>
             <a:fld id="{474456A3-A4FD-4EE9-98D3-AB4F21933CFF}" type="datetimeFigureOut">
               <a:rPr lang="en-US" smtClean="0"/>
-              <a:t>8/31/2020</a:t>
+              <a:t>9/11/2020</a:t>
             </a:fld>
             <a:endParaRPr lang="en-US"/>
           </a:p>
@@ -1134,7 +1296,7 @@
           <a:p>
             <a:fld id="{474456A3-A4FD-4EE9-98D3-AB4F21933CFF}" type="datetimeFigureOut">
               <a:rPr lang="en-US" smtClean="0"/>
-              <a:t>8/31/2020</a:t>
+              <a:t>9/11/2020</a:t>
             </a:fld>
             <a:endParaRPr lang="en-US"/>
           </a:p>
@@ -1399,7 +1561,7 @@
           <a:p>
             <a:fld id="{474456A3-A4FD-4EE9-98D3-AB4F21933CFF}" type="datetimeFigureOut">
               <a:rPr lang="en-US" smtClean="0"/>
-              <a:t>8/31/2020</a:t>
+              <a:t>9/11/2020</a:t>
             </a:fld>
             <a:endParaRPr lang="en-US"/>
           </a:p>
@@ -1811,7 +1973,7 @@
           <a:p>
             <a:fld id="{474456A3-A4FD-4EE9-98D3-AB4F21933CFF}" type="datetimeFigureOut">
               <a:rPr lang="en-US" smtClean="0"/>
-              <a:t>8/31/2020</a:t>
+              <a:t>9/11/2020</a:t>
             </a:fld>
             <a:endParaRPr lang="en-US"/>
           </a:p>
@@ -1952,7 +2114,7 @@
           <a:p>
             <a:fld id="{474456A3-A4FD-4EE9-98D3-AB4F21933CFF}" type="datetimeFigureOut">
               <a:rPr lang="en-US" smtClean="0"/>
-              <a:t>8/31/2020</a:t>
+              <a:t>9/11/2020</a:t>
             </a:fld>
             <a:endParaRPr lang="en-US"/>
           </a:p>
@@ -2065,7 +2227,7 @@
           <a:p>
             <a:fld id="{474456A3-A4FD-4EE9-98D3-AB4F21933CFF}" type="datetimeFigureOut">
               <a:rPr lang="en-US" smtClean="0"/>
-              <a:t>8/31/2020</a:t>
+              <a:t>9/11/2020</a:t>
             </a:fld>
             <a:endParaRPr lang="en-US"/>
           </a:p>
@@ -2376,7 +2538,7 @@
           <a:p>
             <a:fld id="{474456A3-A4FD-4EE9-98D3-AB4F21933CFF}" type="datetimeFigureOut">
               <a:rPr lang="en-US" smtClean="0"/>
-              <a:t>8/31/2020</a:t>
+              <a:t>9/11/2020</a:t>
             </a:fld>
             <a:endParaRPr lang="en-US"/>
           </a:p>
@@ -2664,7 +2826,7 @@
           <a:p>
             <a:fld id="{474456A3-A4FD-4EE9-98D3-AB4F21933CFF}" type="datetimeFigureOut">
               <a:rPr lang="en-US" smtClean="0"/>
-              <a:t>8/31/2020</a:t>
+              <a:t>9/11/2020</a:t>
             </a:fld>
             <a:endParaRPr lang="en-US"/>
           </a:p>
@@ -2905,7 +3067,7 @@
           <a:p>
             <a:fld id="{474456A3-A4FD-4EE9-98D3-AB4F21933CFF}" type="datetimeFigureOut">
               <a:rPr lang="en-US" smtClean="0"/>
-              <a:t>8/31/2020</a:t>
+              <a:t>9/11/2020</a:t>
             </a:fld>
             <a:endParaRPr lang="en-US"/>
           </a:p>
@@ -4197,6 +4359,617 @@
 </p:sld>
 </file>
 
+<file path=ppt/slides/slide3.xml><?xml version="1.0" encoding="utf-8"?>
+<p:sld xmlns:a="http://schemas.openxmlformats.org/drawingml/2006/main" xmlns:r="http://schemas.openxmlformats.org/officeDocument/2006/relationships" xmlns:p="http://schemas.openxmlformats.org/presentationml/2006/main">
+  <p:cSld>
+    <p:spTree>
+      <p:nvGrpSpPr>
+        <p:cNvPr id="1" name=""/>
+        <p:cNvGrpSpPr/>
+        <p:nvPr/>
+      </p:nvGrpSpPr>
+      <p:grpSpPr>
+        <a:xfrm>
+          <a:off x="0" y="0"/>
+          <a:ext cx="0" cy="0"/>
+          <a:chOff x="0" y="0"/>
+          <a:chExt cx="0" cy="0"/>
+        </a:xfrm>
+      </p:grpSpPr>
+      <p:sp>
+        <p:nvSpPr>
+          <p:cNvPr id="2" name="Title 1">
+            <a:extLst>
+              <a:ext uri="{FF2B5EF4-FFF2-40B4-BE49-F238E27FC236}">
+                <a16:creationId xmlns:a16="http://schemas.microsoft.com/office/drawing/2014/main" id="{5A718AC9-0D22-46C1-B301-22A509B852C4}"/>
+              </a:ext>
+            </a:extLst>
+          </p:cNvPr>
+          <p:cNvSpPr>
+            <a:spLocks noGrp="1"/>
+          </p:cNvSpPr>
+          <p:nvPr>
+            <p:ph type="title"/>
+          </p:nvPr>
+        </p:nvSpPr>
+        <p:spPr/>
+        <p:txBody>
+          <a:bodyPr/>
+          <a:lstStyle/>
+          <a:p>
+            <a:r>
+              <a:rPr lang="en-US" dirty="0"/>
+              <a:t>Convergence Curves.</a:t>
+            </a:r>
+          </a:p>
+        </p:txBody>
+      </p:sp>
+      <mc:AlternateContent xmlns:mc="http://schemas.openxmlformats.org/markup-compatibility/2006">
+        <mc:Choice xmlns:p14="http://schemas.microsoft.com/office/powerpoint/2010/main" Requires="p14">
+          <p:contentPart p14:bwMode="auto" r:id="rId2">
+            <p14:nvContentPartPr>
+              <p14:cNvPr id="17" name="Ink 16">
+                <a:extLst>
+                  <a:ext uri="{FF2B5EF4-FFF2-40B4-BE49-F238E27FC236}">
+                    <a16:creationId xmlns:a16="http://schemas.microsoft.com/office/drawing/2014/main" id="{E74C100E-0054-4BDD-AF71-5405D6BCD13A}"/>
+                  </a:ext>
+                </a:extLst>
+              </p14:cNvPr>
+              <p14:cNvContentPartPr/>
+              <p14:nvPr/>
+            </p14:nvContentPartPr>
+            <p14:xfrm>
+              <a:off x="2249446" y="3003660"/>
+              <a:ext cx="6022440" cy="2493720"/>
+            </p14:xfrm>
+          </p:contentPart>
+        </mc:Choice>
+        <mc:Fallback>
+          <p:pic>
+            <p:nvPicPr>
+              <p:cNvPr id="17" name="Ink 16">
+                <a:extLst>
+                  <a:ext uri="{FF2B5EF4-FFF2-40B4-BE49-F238E27FC236}">
+                    <a16:creationId xmlns:a16="http://schemas.microsoft.com/office/drawing/2014/main" id="{E74C100E-0054-4BDD-AF71-5405D6BCD13A}"/>
+                  </a:ext>
+                </a:extLst>
+              </p:cNvPr>
+              <p:cNvPicPr/>
+              <p:nvPr/>
+            </p:nvPicPr>
+            <p:blipFill>
+              <a:blip r:embed="rId3"/>
+              <a:stretch>
+                <a:fillRect/>
+              </a:stretch>
+            </p:blipFill>
+            <p:spPr>
+              <a:xfrm>
+                <a:off x="2240446" y="2994660"/>
+                <a:ext cx="6040080" cy="2511360"/>
+              </a:xfrm>
+              <a:prstGeom prst="rect">
+                <a:avLst/>
+              </a:prstGeom>
+            </p:spPr>
+          </p:pic>
+        </mc:Fallback>
+      </mc:AlternateContent>
+      <mc:AlternateContent xmlns:mc="http://schemas.openxmlformats.org/markup-compatibility/2006">
+        <mc:Choice xmlns:p14="http://schemas.microsoft.com/office/powerpoint/2010/main" Requires="p14">
+          <p:contentPart p14:bwMode="auto" r:id="rId4">
+            <p14:nvContentPartPr>
+              <p14:cNvPr id="19" name="Ink 18">
+                <a:extLst>
+                  <a:ext uri="{FF2B5EF4-FFF2-40B4-BE49-F238E27FC236}">
+                    <a16:creationId xmlns:a16="http://schemas.microsoft.com/office/drawing/2014/main" id="{D3945B51-37E7-4C24-8288-28BB7CF05F61}"/>
+                  </a:ext>
+                </a:extLst>
+              </p14:cNvPr>
+              <p14:cNvContentPartPr/>
+              <p14:nvPr/>
+            </p14:nvContentPartPr>
+            <p14:xfrm>
+              <a:off x="2065126" y="2624940"/>
+              <a:ext cx="6448680" cy="2665440"/>
+            </p14:xfrm>
+          </p:contentPart>
+        </mc:Choice>
+        <mc:Fallback>
+          <p:pic>
+            <p:nvPicPr>
+              <p:cNvPr id="19" name="Ink 18">
+                <a:extLst>
+                  <a:ext uri="{FF2B5EF4-FFF2-40B4-BE49-F238E27FC236}">
+                    <a16:creationId xmlns:a16="http://schemas.microsoft.com/office/drawing/2014/main" id="{D3945B51-37E7-4C24-8288-28BB7CF05F61}"/>
+                  </a:ext>
+                </a:extLst>
+              </p:cNvPr>
+              <p:cNvPicPr/>
+              <p:nvPr/>
+            </p:nvPicPr>
+            <p:blipFill>
+              <a:blip r:embed="rId5"/>
+              <a:stretch>
+                <a:fillRect/>
+              </a:stretch>
+            </p:blipFill>
+            <p:spPr>
+              <a:xfrm>
+                <a:off x="2056126" y="2616300"/>
+                <a:ext cx="6466320" cy="2683080"/>
+              </a:xfrm>
+              <a:prstGeom prst="rect">
+                <a:avLst/>
+              </a:prstGeom>
+            </p:spPr>
+          </p:pic>
+        </mc:Fallback>
+      </mc:AlternateContent>
+      <p:grpSp>
+        <p:nvGrpSpPr>
+          <p:cNvPr id="22" name="Group 21">
+            <a:extLst>
+              <a:ext uri="{FF2B5EF4-FFF2-40B4-BE49-F238E27FC236}">
+                <a16:creationId xmlns:a16="http://schemas.microsoft.com/office/drawing/2014/main" id="{3EFD54C3-F7A8-4635-A118-E4BBC8619B19}"/>
+              </a:ext>
+            </a:extLst>
+          </p:cNvPr>
+          <p:cNvGrpSpPr/>
+          <p:nvPr/>
+        </p:nvGrpSpPr>
+        <p:grpSpPr>
+          <a:xfrm>
+            <a:off x="1376806" y="2378700"/>
+            <a:ext cx="9300600" cy="3707280"/>
+            <a:chOff x="1376806" y="2378700"/>
+            <a:chExt cx="9300600" cy="3707280"/>
+          </a:xfrm>
+        </p:grpSpPr>
+        <mc:AlternateContent xmlns:mc="http://schemas.openxmlformats.org/markup-compatibility/2006">
+          <mc:Choice xmlns:p14="http://schemas.microsoft.com/office/powerpoint/2010/main" Requires="p14">
+            <p:contentPart p14:bwMode="auto" r:id="rId6">
+              <p14:nvContentPartPr>
+                <p14:cNvPr id="13" name="Ink 12">
+                  <a:extLst>
+                    <a:ext uri="{FF2B5EF4-FFF2-40B4-BE49-F238E27FC236}">
+                      <a16:creationId xmlns:a16="http://schemas.microsoft.com/office/drawing/2014/main" id="{D08C5A64-73BD-4F5B-8E27-434CD11EE882}"/>
+                    </a:ext>
+                  </a:extLst>
+                </p14:cNvPr>
+                <p14:cNvContentPartPr/>
+                <p14:nvPr/>
+              </p14:nvContentPartPr>
+              <p14:xfrm>
+                <a:off x="1601806" y="2428380"/>
+                <a:ext cx="120960" cy="3499200"/>
+              </p14:xfrm>
+            </p:contentPart>
+          </mc:Choice>
+          <mc:Fallback>
+            <p:pic>
+              <p:nvPicPr>
+                <p:cNvPr id="13" name="Ink 12">
+                  <a:extLst>
+                    <a:ext uri="{FF2B5EF4-FFF2-40B4-BE49-F238E27FC236}">
+                      <a16:creationId xmlns:a16="http://schemas.microsoft.com/office/drawing/2014/main" id="{D08C5A64-73BD-4F5B-8E27-434CD11EE882}"/>
+                    </a:ext>
+                  </a:extLst>
+                </p:cNvPr>
+                <p:cNvPicPr/>
+                <p:nvPr/>
+              </p:nvPicPr>
+              <p:blipFill>
+                <a:blip r:embed="rId7"/>
+                <a:stretch>
+                  <a:fillRect/>
+                </a:stretch>
+              </p:blipFill>
+              <p:spPr>
+                <a:xfrm>
+                  <a:off x="1592806" y="2419380"/>
+                  <a:ext cx="138600" cy="3516840"/>
+                </a:xfrm>
+                <a:prstGeom prst="rect">
+                  <a:avLst/>
+                </a:prstGeom>
+              </p:spPr>
+            </p:pic>
+          </mc:Fallback>
+        </mc:AlternateContent>
+        <mc:AlternateContent xmlns:mc="http://schemas.openxmlformats.org/markup-compatibility/2006">
+          <mc:Choice xmlns:p14="http://schemas.microsoft.com/office/powerpoint/2010/main" Requires="p14">
+            <p:contentPart p14:bwMode="auto" r:id="rId8">
+              <p14:nvContentPartPr>
+                <p14:cNvPr id="14" name="Ink 13">
+                  <a:extLst>
+                    <a:ext uri="{FF2B5EF4-FFF2-40B4-BE49-F238E27FC236}">
+                      <a16:creationId xmlns:a16="http://schemas.microsoft.com/office/drawing/2014/main" id="{CA626226-E6A4-4BB1-9EEA-9239513DED92}"/>
+                    </a:ext>
+                  </a:extLst>
+                </p14:cNvPr>
+                <p14:cNvContentPartPr/>
+                <p14:nvPr/>
+              </p14:nvContentPartPr>
+              <p14:xfrm>
+                <a:off x="1376806" y="2378700"/>
+                <a:ext cx="405360" cy="434520"/>
+              </p14:xfrm>
+            </p:contentPart>
+          </mc:Choice>
+          <mc:Fallback>
+            <p:pic>
+              <p:nvPicPr>
+                <p:cNvPr id="14" name="Ink 13">
+                  <a:extLst>
+                    <a:ext uri="{FF2B5EF4-FFF2-40B4-BE49-F238E27FC236}">
+                      <a16:creationId xmlns:a16="http://schemas.microsoft.com/office/drawing/2014/main" id="{CA626226-E6A4-4BB1-9EEA-9239513DED92}"/>
+                    </a:ext>
+                  </a:extLst>
+                </p:cNvPr>
+                <p:cNvPicPr/>
+                <p:nvPr/>
+              </p:nvPicPr>
+              <p:blipFill>
+                <a:blip r:embed="rId9"/>
+                <a:stretch>
+                  <a:fillRect/>
+                </a:stretch>
+              </p:blipFill>
+              <p:spPr>
+                <a:xfrm>
+                  <a:off x="1367806" y="2369700"/>
+                  <a:ext cx="423000" cy="452160"/>
+                </a:xfrm>
+                <a:prstGeom prst="rect">
+                  <a:avLst/>
+                </a:prstGeom>
+              </p:spPr>
+            </p:pic>
+          </mc:Fallback>
+        </mc:AlternateContent>
+        <mc:AlternateContent xmlns:mc="http://schemas.openxmlformats.org/markup-compatibility/2006">
+          <mc:Choice xmlns:p14="http://schemas.microsoft.com/office/powerpoint/2010/main" Requires="p14">
+            <p:contentPart p14:bwMode="auto" r:id="rId10">
+              <p14:nvContentPartPr>
+                <p14:cNvPr id="16" name="Ink 15">
+                  <a:extLst>
+                    <a:ext uri="{FF2B5EF4-FFF2-40B4-BE49-F238E27FC236}">
+                      <a16:creationId xmlns:a16="http://schemas.microsoft.com/office/drawing/2014/main" id="{C8FC1F7D-8444-49EA-B94D-583A5C404A81}"/>
+                    </a:ext>
+                  </a:extLst>
+                </p14:cNvPr>
+                <p14:cNvContentPartPr/>
+                <p14:nvPr/>
+              </p14:nvContentPartPr>
+              <p14:xfrm>
+                <a:off x="1579126" y="5355540"/>
+                <a:ext cx="9098280" cy="730440"/>
+              </p14:xfrm>
+            </p:contentPart>
+          </mc:Choice>
+          <mc:Fallback>
+            <p:pic>
+              <p:nvPicPr>
+                <p:cNvPr id="16" name="Ink 15">
+                  <a:extLst>
+                    <a:ext uri="{FF2B5EF4-FFF2-40B4-BE49-F238E27FC236}">
+                      <a16:creationId xmlns:a16="http://schemas.microsoft.com/office/drawing/2014/main" id="{C8FC1F7D-8444-49EA-B94D-583A5C404A81}"/>
+                    </a:ext>
+                  </a:extLst>
+                </p:cNvPr>
+                <p:cNvPicPr/>
+                <p:nvPr/>
+              </p:nvPicPr>
+              <p:blipFill>
+                <a:blip r:embed="rId11"/>
+                <a:stretch>
+                  <a:fillRect/>
+                </a:stretch>
+              </p:blipFill>
+              <p:spPr>
+                <a:xfrm>
+                  <a:off x="1570486" y="5346540"/>
+                  <a:ext cx="9115920" cy="748080"/>
+                </a:xfrm>
+                <a:prstGeom prst="rect">
+                  <a:avLst/>
+                </a:prstGeom>
+              </p:spPr>
+            </p:pic>
+          </mc:Fallback>
+        </mc:AlternateContent>
+        <mc:AlternateContent xmlns:mc="http://schemas.openxmlformats.org/markup-compatibility/2006">
+          <mc:Choice xmlns:p14="http://schemas.microsoft.com/office/powerpoint/2010/main" Requires="p14">
+            <p:contentPart p14:bwMode="auto" r:id="rId12">
+              <p14:nvContentPartPr>
+                <p14:cNvPr id="21" name="Ink 20">
+                  <a:extLst>
+                    <a:ext uri="{FF2B5EF4-FFF2-40B4-BE49-F238E27FC236}">
+                      <a16:creationId xmlns:a16="http://schemas.microsoft.com/office/drawing/2014/main" id="{FB247CEB-9EF2-482D-8EE2-1F1190C50324}"/>
+                    </a:ext>
+                  </a:extLst>
+                </p14:cNvPr>
+                <p14:cNvContentPartPr/>
+                <p14:nvPr/>
+              </p14:nvContentPartPr>
+              <p14:xfrm>
+                <a:off x="1914646" y="3365100"/>
+                <a:ext cx="6138720" cy="2157840"/>
+              </p14:xfrm>
+            </p:contentPart>
+          </mc:Choice>
+          <mc:Fallback>
+            <p:pic>
+              <p:nvPicPr>
+                <p:cNvPr id="21" name="Ink 20">
+                  <a:extLst>
+                    <a:ext uri="{FF2B5EF4-FFF2-40B4-BE49-F238E27FC236}">
+                      <a16:creationId xmlns:a16="http://schemas.microsoft.com/office/drawing/2014/main" id="{FB247CEB-9EF2-482D-8EE2-1F1190C50324}"/>
+                    </a:ext>
+                  </a:extLst>
+                </p:cNvPr>
+                <p:cNvPicPr/>
+                <p:nvPr/>
+              </p:nvPicPr>
+              <p:blipFill>
+                <a:blip r:embed="rId13"/>
+                <a:stretch>
+                  <a:fillRect/>
+                </a:stretch>
+              </p:blipFill>
+              <p:spPr>
+                <a:xfrm>
+                  <a:off x="1905646" y="3356460"/>
+                  <a:ext cx="6156360" cy="2175480"/>
+                </a:xfrm>
+                <a:prstGeom prst="rect">
+                  <a:avLst/>
+                </a:prstGeom>
+              </p:spPr>
+            </p:pic>
+          </mc:Fallback>
+        </mc:AlternateContent>
+      </p:grpSp>
+      <p:sp>
+        <p:nvSpPr>
+          <p:cNvPr id="23" name="TextBox 22">
+            <a:extLst>
+              <a:ext uri="{FF2B5EF4-FFF2-40B4-BE49-F238E27FC236}">
+                <a16:creationId xmlns:a16="http://schemas.microsoft.com/office/drawing/2014/main" id="{F4F2A9DF-B80D-4F3A-8907-6065060E4FFA}"/>
+              </a:ext>
+            </a:extLst>
+          </p:cNvPr>
+          <p:cNvSpPr txBox="1"/>
+          <p:nvPr/>
+        </p:nvSpPr>
+        <p:spPr>
+          <a:xfrm>
+            <a:off x="4984006" y="5855677"/>
+            <a:ext cx="2234479" cy="369332"/>
+          </a:xfrm>
+          <a:prstGeom prst="rect">
+            <a:avLst/>
+          </a:prstGeom>
+          <a:noFill/>
+        </p:spPr>
+        <p:txBody>
+          <a:bodyPr wrap="square" rtlCol="0">
+            <a:spAutoFit/>
+          </a:bodyPr>
+          <a:lstStyle/>
+          <a:p>
+            <a:r>
+              <a:rPr lang="en-US" dirty="0"/>
+              <a:t>Number of iterations</a:t>
+            </a:r>
+          </a:p>
+        </p:txBody>
+      </p:sp>
+      <p:sp>
+        <p:nvSpPr>
+          <p:cNvPr id="24" name="TextBox 23">
+            <a:extLst>
+              <a:ext uri="{FF2B5EF4-FFF2-40B4-BE49-F238E27FC236}">
+                <a16:creationId xmlns:a16="http://schemas.microsoft.com/office/drawing/2014/main" id="{8FF365CD-DF87-4BF3-A52A-D9AFBE1BFD34}"/>
+              </a:ext>
+            </a:extLst>
+          </p:cNvPr>
+          <p:cNvSpPr txBox="1"/>
+          <p:nvPr/>
+        </p:nvSpPr>
+        <p:spPr>
+          <a:xfrm rot="16200000">
+            <a:off x="-543533" y="3514679"/>
+            <a:ext cx="3020122" cy="369332"/>
+          </a:xfrm>
+          <a:prstGeom prst="rect">
+            <a:avLst/>
+          </a:prstGeom>
+          <a:noFill/>
+        </p:spPr>
+        <p:txBody>
+          <a:bodyPr wrap="square" rtlCol="0">
+            <a:spAutoFit/>
+          </a:bodyPr>
+          <a:lstStyle/>
+          <a:p>
+            <a:r>
+              <a:rPr lang="en-US" dirty="0"/>
+              <a:t>Optimum value discovered</a:t>
+            </a:r>
+          </a:p>
+        </p:txBody>
+      </p:sp>
+      <p:sp>
+        <p:nvSpPr>
+          <p:cNvPr id="25" name="TextBox 24">
+            <a:extLst>
+              <a:ext uri="{FF2B5EF4-FFF2-40B4-BE49-F238E27FC236}">
+                <a16:creationId xmlns:a16="http://schemas.microsoft.com/office/drawing/2014/main" id="{A6B140AD-8A4B-4C7A-B24A-0ABCC5E1C083}"/>
+              </a:ext>
+            </a:extLst>
+          </p:cNvPr>
+          <p:cNvSpPr txBox="1"/>
+          <p:nvPr/>
+        </p:nvSpPr>
+        <p:spPr>
+          <a:xfrm>
+            <a:off x="4345019" y="4149540"/>
+            <a:ext cx="2234479" cy="369332"/>
+          </a:xfrm>
+          <a:prstGeom prst="rect">
+            <a:avLst/>
+          </a:prstGeom>
+          <a:noFill/>
+        </p:spPr>
+        <p:txBody>
+          <a:bodyPr wrap="square" rtlCol="0">
+            <a:spAutoFit/>
+          </a:bodyPr>
+          <a:lstStyle/>
+          <a:p>
+            <a:r>
+              <a:rPr lang="en-US" dirty="0"/>
+              <a:t>Average Curve</a:t>
+            </a:r>
+          </a:p>
+        </p:txBody>
+      </p:sp>
+      <p:sp>
+        <p:nvSpPr>
+          <p:cNvPr id="26" name="TextBox 25">
+            <a:extLst>
+              <a:ext uri="{FF2B5EF4-FFF2-40B4-BE49-F238E27FC236}">
+                <a16:creationId xmlns:a16="http://schemas.microsoft.com/office/drawing/2014/main" id="{C6CB0296-4F4F-4E6A-BF2E-7F0294976F1A}"/>
+              </a:ext>
+            </a:extLst>
+          </p:cNvPr>
+          <p:cNvSpPr txBox="1"/>
+          <p:nvPr/>
+        </p:nvSpPr>
+        <p:spPr>
+          <a:xfrm>
+            <a:off x="2007166" y="2254735"/>
+            <a:ext cx="2234479" cy="369332"/>
+          </a:xfrm>
+          <a:prstGeom prst="rect">
+            <a:avLst/>
+          </a:prstGeom>
+          <a:noFill/>
+        </p:spPr>
+        <p:txBody>
+          <a:bodyPr wrap="square" rtlCol="0">
+            <a:spAutoFit/>
+          </a:bodyPr>
+          <a:lstStyle/>
+          <a:p>
+            <a:r>
+              <a:rPr lang="en-US" dirty="0"/>
+              <a:t>Max Curve</a:t>
+            </a:r>
+          </a:p>
+        </p:txBody>
+      </p:sp>
+      <p:sp>
+        <p:nvSpPr>
+          <p:cNvPr id="27" name="TextBox 26">
+            <a:extLst>
+              <a:ext uri="{FF2B5EF4-FFF2-40B4-BE49-F238E27FC236}">
+                <a16:creationId xmlns:a16="http://schemas.microsoft.com/office/drawing/2014/main" id="{57C9BDAD-C100-4CEB-9AB1-1346CDED4203}"/>
+              </a:ext>
+            </a:extLst>
+          </p:cNvPr>
+          <p:cNvSpPr txBox="1"/>
+          <p:nvPr/>
+        </p:nvSpPr>
+        <p:spPr>
+          <a:xfrm>
+            <a:off x="2276795" y="3715048"/>
+            <a:ext cx="2234479" cy="369332"/>
+          </a:xfrm>
+          <a:prstGeom prst="rect">
+            <a:avLst/>
+          </a:prstGeom>
+          <a:noFill/>
+        </p:spPr>
+        <p:txBody>
+          <a:bodyPr wrap="square" rtlCol="0">
+            <a:spAutoFit/>
+          </a:bodyPr>
+          <a:lstStyle/>
+          <a:p>
+            <a:r>
+              <a:rPr lang="en-US" dirty="0"/>
+              <a:t>Min Curve</a:t>
+            </a:r>
+          </a:p>
+        </p:txBody>
+      </p:sp>
+      <p:sp>
+        <p:nvSpPr>
+          <p:cNvPr id="28" name="TextBox 27">
+            <a:extLst>
+              <a:ext uri="{FF2B5EF4-FFF2-40B4-BE49-F238E27FC236}">
+                <a16:creationId xmlns:a16="http://schemas.microsoft.com/office/drawing/2014/main" id="{5149025F-F4FB-45C6-83AE-78BD1E6EE9D1}"/>
+              </a:ext>
+            </a:extLst>
+          </p:cNvPr>
+          <p:cNvSpPr txBox="1"/>
+          <p:nvPr/>
+        </p:nvSpPr>
+        <p:spPr>
+          <a:xfrm>
+            <a:off x="6279327" y="2078545"/>
+            <a:ext cx="5074473" cy="2308324"/>
+          </a:xfrm>
+          <a:prstGeom prst="rect">
+            <a:avLst/>
+          </a:prstGeom>
+          <a:noFill/>
+        </p:spPr>
+        <p:txBody>
+          <a:bodyPr wrap="square" rtlCol="0">
+            <a:spAutoFit/>
+          </a:bodyPr>
+          <a:lstStyle/>
+          <a:p>
+            <a:r>
+              <a:rPr lang="en-US" dirty="0"/>
+              <a:t>Optimization algorithms have various parameters and evaluating the performance of an algorithm on a single set of parameters for a problem space is not an accurate indicator of the algorithms performance. Instead its </a:t>
+            </a:r>
+            <a:r>
+              <a:rPr lang="en-US" dirty="0" err="1"/>
+              <a:t>nessisary</a:t>
+            </a:r>
+            <a:r>
+              <a:rPr lang="en-US" dirty="0"/>
+              <a:t> to sample a number of parameter sets and compare Max, Min, average Convergence curves to determine the </a:t>
+            </a:r>
+            <a:r>
+              <a:rPr lang="en-US" dirty="0" err="1"/>
+              <a:t>algorithums</a:t>
+            </a:r>
+            <a:r>
+              <a:rPr lang="en-US" dirty="0"/>
+              <a:t> performance. </a:t>
+            </a:r>
+          </a:p>
+        </p:txBody>
+      </p:sp>
+    </p:spTree>
+    <p:extLst>
+      <p:ext uri="{BB962C8B-B14F-4D97-AF65-F5344CB8AC3E}">
+        <p14:creationId xmlns:p14="http://schemas.microsoft.com/office/powerpoint/2010/main" val="963876989"/>
+      </p:ext>
+    </p:extLst>
+  </p:cSld>
+  <p:clrMapOvr>
+    <a:masterClrMapping/>
+  </p:clrMapOvr>
+</p:sld>
+</file>
+
 <file path=ppt/theme/theme1.xml><?xml version="1.0" encoding="utf-8"?>
 <a:theme xmlns:a="http://schemas.openxmlformats.org/drawingml/2006/main" name="Office Theme">
   <a:themeElements>

</xml_diff>